<commit_message>
Sua Slide 3, 7
By Phat Bui
</commit_message>
<xml_diff>
--- a/nhom 7.pptx
+++ b/nhom 7.pptx
@@ -4507,7 +4507,7 @@
         <p:spPr>
           <a:xfrm>
             <a:off x="457200" y="1981200"/>
-            <a:ext cx="2590800" cy="1754326"/>
+            <a:ext cx="4191000" cy="2585323"/>
           </a:xfrm>
           <a:prstGeom prst="rect">
             <a:avLst/>
@@ -4540,32 +4540,301 @@
           <a:p>
             <a:r>
               <a:rPr lang="en-US" dirty="0" smtClean="0"/>
-              <a:t>1</a:t>
-            </a:r>
-          </a:p>
-          <a:p>
-            <a:r>
-              <a:rPr lang="en-US" dirty="0" smtClean="0"/>
-              <a:t>2</a:t>
-            </a:r>
-          </a:p>
-          <a:p>
-            <a:r>
-              <a:rPr lang="en-US" dirty="0" smtClean="0"/>
-              <a:t>3</a:t>
-            </a:r>
-          </a:p>
-          <a:p>
-            <a:r>
-              <a:rPr lang="en-US" dirty="0" smtClean="0"/>
-              <a:t>4</a:t>
-            </a:r>
-          </a:p>
-          <a:p>
+              <a:t>1. </a:t>
+            </a:r>
+            <a:r>
+              <a:rPr lang="en-US" dirty="0" err="1" smtClean="0"/>
+              <a:t>Nguyễn</a:t>
+            </a:r>
+            <a:r>
+              <a:rPr lang="en-US" dirty="0" smtClean="0"/>
+              <a:t> Minh </a:t>
+            </a:r>
+            <a:r>
+              <a:rPr lang="en-US" dirty="0" err="1" smtClean="0"/>
+              <a:t>Đức</a:t>
+            </a:r>
+            <a:r>
+              <a:rPr lang="en-US" dirty="0" smtClean="0"/>
+              <a:t>: </a:t>
+            </a:r>
+            <a:r>
+              <a:rPr lang="en-US" dirty="0" err="1" smtClean="0"/>
+              <a:t>Đức</a:t>
+            </a:r>
+            <a:r>
+              <a:rPr lang="en-US" dirty="0" smtClean="0"/>
+              <a:t> </a:t>
+            </a:r>
+            <a:r>
+              <a:rPr lang="en-US" dirty="0" err="1" smtClean="0"/>
+              <a:t>lúc</a:t>
+            </a:r>
+            <a:r>
+              <a:rPr lang="en-US" dirty="0" smtClean="0"/>
+              <a:t> </a:t>
+            </a:r>
+            <a:r>
+              <a:rPr lang="en-US" dirty="0" err="1" smtClean="0"/>
+              <a:t>đã</a:t>
+            </a:r>
+            <a:r>
+              <a:rPr lang="en-US" dirty="0" smtClean="0"/>
+              <a:t> </a:t>
+            </a:r>
+            <a:r>
+              <a:rPr lang="en-US" dirty="0" err="1" smtClean="0"/>
+              <a:t>lớn</a:t>
+            </a:r>
+            <a:r>
+              <a:rPr lang="en-US" dirty="0" smtClean="0"/>
+              <a:t>.</a:t>
+            </a:r>
+            <a:endParaRPr lang="en-US" dirty="0" smtClean="0"/>
+          </a:p>
+          <a:p>
+            <a:r>
+              <a:rPr lang="en-US" dirty="0" smtClean="0"/>
+              <a:t>2. </a:t>
+            </a:r>
+            <a:r>
+              <a:rPr lang="en-US" dirty="0" err="1" smtClean="0"/>
+              <a:t>Trưởng</a:t>
+            </a:r>
+            <a:r>
+              <a:rPr lang="en-US" dirty="0" smtClean="0"/>
+              <a:t> </a:t>
+            </a:r>
+            <a:r>
+              <a:rPr lang="en-US" dirty="0" err="1" smtClean="0"/>
+              <a:t>Văn</a:t>
+            </a:r>
+            <a:r>
+              <a:rPr lang="en-US" dirty="0" smtClean="0"/>
+              <a:t> Khan: </a:t>
+            </a:r>
+            <a:r>
+              <a:rPr lang="en-US" dirty="0" err="1" smtClean="0"/>
+              <a:t>Đức</a:t>
+            </a:r>
+            <a:r>
+              <a:rPr lang="en-US" dirty="0" smtClean="0"/>
+              <a:t> </a:t>
+            </a:r>
+            <a:r>
+              <a:rPr lang="en-US" dirty="0" err="1" smtClean="0"/>
+              <a:t>lúc</a:t>
+            </a:r>
+            <a:r>
+              <a:rPr lang="en-US" dirty="0" smtClean="0"/>
+              <a:t> </a:t>
+            </a:r>
+            <a:r>
+              <a:rPr lang="en-US" dirty="0" err="1" smtClean="0"/>
+              <a:t>còn</a:t>
+            </a:r>
+            <a:r>
+              <a:rPr lang="en-US" dirty="0" smtClean="0"/>
+              <a:t> </a:t>
+            </a:r>
+            <a:r>
+              <a:rPr lang="en-US" dirty="0" err="1" smtClean="0"/>
+              <a:t>nhỏ</a:t>
+            </a:r>
             <a:r>
               <a:rPr lang="en-US" dirty="0"/>
-              <a:t>5</a:t>
-            </a:r>
+              <a:t>.</a:t>
+            </a:r>
+            <a:endParaRPr lang="en-US" dirty="0" smtClean="0"/>
+          </a:p>
+          <a:p>
+            <a:r>
+              <a:rPr lang="en-US" dirty="0" smtClean="0"/>
+              <a:t>3. </a:t>
+            </a:r>
+            <a:r>
+              <a:rPr lang="en-US" dirty="0" err="1" smtClean="0"/>
+              <a:t>Nguyễn</a:t>
+            </a:r>
+            <a:r>
+              <a:rPr lang="en-US" dirty="0" smtClean="0"/>
+              <a:t> </a:t>
+            </a:r>
+            <a:r>
+              <a:rPr lang="en-US" dirty="0" err="1" smtClean="0"/>
+              <a:t>Ngọc</a:t>
+            </a:r>
+            <a:r>
+              <a:rPr lang="en-US" dirty="0" smtClean="0"/>
+              <a:t> </a:t>
+            </a:r>
+            <a:r>
+              <a:rPr lang="en-US" dirty="0" err="1" smtClean="0"/>
+              <a:t>Hảo</a:t>
+            </a:r>
+            <a:r>
+              <a:rPr lang="en-US" dirty="0" smtClean="0"/>
+              <a:t>: </a:t>
+            </a:r>
+          </a:p>
+          <a:p>
+            <a:r>
+              <a:rPr lang="en-US" dirty="0" smtClean="0"/>
+              <a:t>Cha </a:t>
+            </a:r>
+            <a:r>
+              <a:rPr lang="en-US" dirty="0" err="1" smtClean="0"/>
+              <a:t>của</a:t>
+            </a:r>
+            <a:r>
+              <a:rPr lang="en-US" dirty="0" smtClean="0"/>
+              <a:t> </a:t>
+            </a:r>
+            <a:r>
+              <a:rPr lang="en-US" dirty="0" err="1" smtClean="0"/>
+              <a:t>Đức</a:t>
+            </a:r>
+            <a:r>
+              <a:rPr lang="en-US" dirty="0" smtClean="0"/>
+              <a:t>.</a:t>
+            </a:r>
+            <a:endParaRPr lang="en-US" dirty="0" smtClean="0"/>
+          </a:p>
+          <a:p>
+            <a:r>
+              <a:rPr lang="en-US" dirty="0" smtClean="0"/>
+              <a:t>4. </a:t>
+            </a:r>
+            <a:r>
+              <a:rPr lang="en-US" dirty="0" err="1" smtClean="0"/>
+              <a:t>Nguyễn</a:t>
+            </a:r>
+            <a:r>
+              <a:rPr lang="en-US" dirty="0" smtClean="0"/>
+              <a:t> </a:t>
+            </a:r>
+            <a:r>
+              <a:rPr lang="en-US" dirty="0" err="1" smtClean="0"/>
+              <a:t>Tăng</a:t>
+            </a:r>
+            <a:r>
+              <a:rPr lang="en-US" dirty="0" smtClean="0"/>
+              <a:t> </a:t>
+            </a:r>
+            <a:r>
+              <a:rPr lang="en-US" dirty="0" err="1" smtClean="0"/>
+              <a:t>Tài</a:t>
+            </a:r>
+            <a:r>
+              <a:rPr lang="en-US" dirty="0" smtClean="0"/>
+              <a:t>:</a:t>
+            </a:r>
+          </a:p>
+          <a:p>
+            <a:r>
+              <a:rPr lang="en-US" dirty="0" err="1" smtClean="0"/>
+              <a:t>Chú</a:t>
+            </a:r>
+            <a:r>
+              <a:rPr lang="en-US" dirty="0" smtClean="0"/>
+              <a:t> </a:t>
+            </a:r>
+            <a:r>
+              <a:rPr lang="en-US" dirty="0" err="1" smtClean="0"/>
+              <a:t>của</a:t>
+            </a:r>
+            <a:r>
+              <a:rPr lang="en-US" dirty="0" smtClean="0"/>
+              <a:t> </a:t>
+            </a:r>
+            <a:r>
+              <a:rPr lang="en-US" dirty="0" err="1" smtClean="0"/>
+              <a:t>Đức</a:t>
+            </a:r>
+            <a:r>
+              <a:rPr lang="en-US" dirty="0"/>
+              <a:t>.</a:t>
+            </a:r>
+            <a:endParaRPr lang="en-US" dirty="0" smtClean="0"/>
+          </a:p>
+          <a:p>
+            <a:r>
+              <a:rPr lang="en-US" dirty="0" smtClean="0"/>
+              <a:t>5. </a:t>
+            </a:r>
+            <a:r>
+              <a:rPr lang="en-US" dirty="0" err="1" smtClean="0"/>
+              <a:t>Bùi</a:t>
+            </a:r>
+            <a:r>
+              <a:rPr lang="en-US" dirty="0" smtClean="0"/>
+              <a:t> </a:t>
+            </a:r>
+            <a:r>
+              <a:rPr lang="en-US" dirty="0" err="1" smtClean="0"/>
+              <a:t>Tiến</a:t>
+            </a:r>
+            <a:r>
+              <a:rPr lang="en-US" dirty="0" smtClean="0"/>
+              <a:t> </a:t>
+            </a:r>
+            <a:r>
+              <a:rPr lang="en-US" dirty="0" err="1" smtClean="0"/>
+              <a:t>Phát</a:t>
+            </a:r>
+            <a:r>
+              <a:rPr lang="en-US" dirty="0" smtClean="0"/>
+              <a:t>: </a:t>
+            </a:r>
+            <a:r>
+              <a:rPr lang="en-US" dirty="0" err="1" smtClean="0"/>
+              <a:t>bạn</a:t>
+            </a:r>
+            <a:r>
+              <a:rPr lang="en-US" dirty="0" smtClean="0"/>
+              <a:t> </a:t>
+            </a:r>
+            <a:r>
+              <a:rPr lang="en-US" dirty="0" err="1" smtClean="0"/>
+              <a:t>học</a:t>
+            </a:r>
+            <a:r>
+              <a:rPr lang="en-US" dirty="0" smtClean="0"/>
+              <a:t> </a:t>
+            </a:r>
+            <a:r>
+              <a:rPr lang="en-US" dirty="0" err="1" smtClean="0"/>
+              <a:t>với</a:t>
+            </a:r>
+            <a:r>
+              <a:rPr lang="en-US" dirty="0" smtClean="0"/>
+              <a:t> </a:t>
+            </a:r>
+            <a:r>
+              <a:rPr lang="en-US" dirty="0" err="1" smtClean="0"/>
+              <a:t>Đức</a:t>
+            </a:r>
+            <a:r>
+              <a:rPr lang="en-US" dirty="0"/>
+              <a:t> </a:t>
+            </a:r>
+            <a:r>
+              <a:rPr lang="en-US" dirty="0" err="1" smtClean="0"/>
+              <a:t>lúc</a:t>
+            </a:r>
+            <a:r>
+              <a:rPr lang="en-US" dirty="0" smtClean="0"/>
+              <a:t> </a:t>
+            </a:r>
+            <a:r>
+              <a:rPr lang="en-US" dirty="0" err="1" smtClean="0"/>
+              <a:t>lớn</a:t>
+            </a:r>
+            <a:r>
+              <a:rPr lang="en-US" dirty="0" smtClean="0"/>
+              <a:t>.</a:t>
+            </a:r>
+            <a:endParaRPr lang="en-US" dirty="0"/>
           </a:p>
         </p:txBody>
       </p:sp>
@@ -4578,7 +4847,7 @@
         <p:spPr>
           <a:xfrm>
             <a:off x="4800600" y="2057400"/>
-            <a:ext cx="3352800" cy="1754326"/>
+            <a:ext cx="3352800" cy="1200329"/>
           </a:xfrm>
           <a:prstGeom prst="rect">
             <a:avLst/>
@@ -4631,32 +4900,47 @@
           <a:p>
             <a:r>
               <a:rPr lang="en-US" dirty="0" smtClean="0"/>
-              <a:t>1</a:t>
-            </a:r>
-          </a:p>
-          <a:p>
-            <a:r>
-              <a:rPr lang="en-US" dirty="0" smtClean="0"/>
-              <a:t>2</a:t>
-            </a:r>
-          </a:p>
-          <a:p>
-            <a:r>
-              <a:rPr lang="en-US" dirty="0" smtClean="0"/>
-              <a:t>3</a:t>
-            </a:r>
-          </a:p>
-          <a:p>
-            <a:r>
-              <a:rPr lang="en-US" dirty="0" smtClean="0"/>
-              <a:t>4</a:t>
-            </a:r>
-          </a:p>
-          <a:p>
-            <a:r>
-              <a:rPr lang="en-US" dirty="0"/>
-              <a:t>5</a:t>
-            </a:r>
+              <a:t>1. </a:t>
+            </a:r>
+            <a:r>
+              <a:rPr lang="en-US" dirty="0" err="1" smtClean="0"/>
+              <a:t>Máy</a:t>
+            </a:r>
+            <a:r>
+              <a:rPr lang="en-US" dirty="0" smtClean="0"/>
+              <a:t> Fujifilm </a:t>
+            </a:r>
+            <a:r>
+              <a:rPr lang="en-US" dirty="0" err="1" smtClean="0"/>
+              <a:t>Finepix</a:t>
+            </a:r>
+            <a:r>
+              <a:rPr lang="en-US" dirty="0" smtClean="0"/>
+              <a:t> S9400w</a:t>
+            </a:r>
+            <a:endParaRPr lang="en-US" dirty="0" smtClean="0"/>
+          </a:p>
+          <a:p>
+            <a:r>
+              <a:rPr lang="en-US" dirty="0" smtClean="0"/>
+              <a:t>2. </a:t>
+            </a:r>
+            <a:r>
+              <a:rPr lang="en-US" dirty="0" err="1" smtClean="0"/>
+              <a:t>Hitfilm</a:t>
+            </a:r>
+            <a:r>
+              <a:rPr lang="en-US" dirty="0" smtClean="0"/>
+              <a:t> 4 Express</a:t>
+            </a:r>
+            <a:endParaRPr lang="en-US" dirty="0" smtClean="0"/>
+          </a:p>
+          <a:p>
+            <a:r>
+              <a:rPr lang="en-US" dirty="0" smtClean="0"/>
+              <a:t>3. Audacity</a:t>
+            </a:r>
+            <a:endParaRPr lang="en-US" dirty="0" smtClean="0"/>
           </a:p>
         </p:txBody>
       </p:sp>
@@ -5279,7 +5563,7 @@
         <p:spPr>
           <a:xfrm>
             <a:off x="457200" y="1600200"/>
-            <a:ext cx="2895600" cy="1477328"/>
+            <a:ext cx="2895600" cy="1754326"/>
           </a:xfrm>
           <a:prstGeom prst="rect">
             <a:avLst/>
@@ -5320,26 +5604,140 @@
           <a:p>
             <a:r>
               <a:rPr lang="en-US" dirty="0" smtClean="0"/>
-              <a:t>1</a:t>
-            </a:r>
-          </a:p>
-          <a:p>
-            <a:r>
-              <a:rPr lang="en-US" dirty="0" smtClean="0"/>
-              <a:t>2</a:t>
-            </a:r>
-          </a:p>
-          <a:p>
-            <a:r>
-              <a:rPr lang="en-US" dirty="0" smtClean="0"/>
-              <a:t>3</a:t>
-            </a:r>
-          </a:p>
-          <a:p>
+              <a:t>1. </a:t>
+            </a:r>
+            <a:r>
+              <a:rPr lang="en-US" dirty="0" err="1" smtClean="0"/>
+              <a:t>Nguyễn</a:t>
+            </a:r>
+            <a:r>
+              <a:rPr lang="en-US" dirty="0" smtClean="0"/>
+              <a:t> Minh </a:t>
+            </a:r>
+            <a:r>
+              <a:rPr lang="en-US" dirty="0" err="1" smtClean="0"/>
+              <a:t>Đức</a:t>
+            </a:r>
             <a:r>
               <a:rPr lang="en-US" dirty="0"/>
-              <a:t>4</a:t>
-            </a:r>
+              <a:t>.</a:t>
+            </a:r>
+            <a:endParaRPr lang="en-US" dirty="0" smtClean="0"/>
+          </a:p>
+          <a:p>
+            <a:r>
+              <a:rPr lang="en-US" dirty="0" smtClean="0"/>
+              <a:t>2. </a:t>
+            </a:r>
+            <a:r>
+              <a:rPr lang="en-US" dirty="0" err="1" smtClean="0"/>
+              <a:t>Nguyễn</a:t>
+            </a:r>
+            <a:r>
+              <a:rPr lang="en-US" dirty="0" smtClean="0"/>
+              <a:t> </a:t>
+            </a:r>
+            <a:r>
+              <a:rPr lang="en-US" dirty="0" err="1" smtClean="0"/>
+              <a:t>Tăng</a:t>
+            </a:r>
+            <a:r>
+              <a:rPr lang="en-US" dirty="0" smtClean="0"/>
+              <a:t> </a:t>
+            </a:r>
+            <a:r>
+              <a:rPr lang="en-US" dirty="0" err="1" smtClean="0"/>
+              <a:t>Tài</a:t>
+            </a:r>
+            <a:r>
+              <a:rPr lang="en-US" dirty="0" smtClean="0"/>
+              <a:t>.</a:t>
+            </a:r>
+            <a:endParaRPr lang="en-US" dirty="0" smtClean="0"/>
+          </a:p>
+          <a:p>
+            <a:r>
+              <a:rPr lang="en-US" dirty="0" smtClean="0"/>
+              <a:t>3. </a:t>
+            </a:r>
+            <a:r>
+              <a:rPr lang="en-US" dirty="0" err="1" smtClean="0"/>
+              <a:t>Bùi</a:t>
+            </a:r>
+            <a:r>
+              <a:rPr lang="en-US" dirty="0" smtClean="0"/>
+              <a:t> </a:t>
+            </a:r>
+            <a:r>
+              <a:rPr lang="en-US" dirty="0" err="1" smtClean="0"/>
+              <a:t>Tiến</a:t>
+            </a:r>
+            <a:r>
+              <a:rPr lang="en-US" dirty="0" smtClean="0"/>
+              <a:t> </a:t>
+            </a:r>
+            <a:r>
+              <a:rPr lang="en-US" dirty="0" err="1" smtClean="0"/>
+              <a:t>Phát</a:t>
+            </a:r>
+            <a:r>
+              <a:rPr lang="en-US" dirty="0" smtClean="0"/>
+              <a:t>.</a:t>
+            </a:r>
+            <a:endParaRPr lang="en-US" dirty="0" smtClean="0"/>
+          </a:p>
+          <a:p>
+            <a:r>
+              <a:rPr lang="en-US" dirty="0" smtClean="0"/>
+              <a:t>4. </a:t>
+            </a:r>
+            <a:r>
+              <a:rPr lang="en-US" dirty="0" err="1" smtClean="0"/>
+              <a:t>Nguyễn</a:t>
+            </a:r>
+            <a:r>
+              <a:rPr lang="en-US" dirty="0" smtClean="0"/>
+              <a:t> </a:t>
+            </a:r>
+            <a:r>
+              <a:rPr lang="en-US" dirty="0" err="1" smtClean="0"/>
+              <a:t>Ngọc</a:t>
+            </a:r>
+            <a:r>
+              <a:rPr lang="en-US" dirty="0" smtClean="0"/>
+              <a:t> </a:t>
+            </a:r>
+            <a:r>
+              <a:rPr lang="en-US" dirty="0" err="1" smtClean="0"/>
+              <a:t>Hảo</a:t>
+            </a:r>
+            <a:r>
+              <a:rPr lang="en-US" dirty="0" smtClean="0"/>
+              <a:t>.</a:t>
+            </a:r>
+          </a:p>
+          <a:p>
+            <a:r>
+              <a:rPr lang="en-US" dirty="0" smtClean="0"/>
+              <a:t>5. </a:t>
+            </a:r>
+            <a:r>
+              <a:rPr lang="en-US" dirty="0" err="1" smtClean="0"/>
+              <a:t>Trưởng</a:t>
+            </a:r>
+            <a:r>
+              <a:rPr lang="en-US" dirty="0" smtClean="0"/>
+              <a:t> </a:t>
+            </a:r>
+            <a:r>
+              <a:rPr lang="en-US" dirty="0" err="1" smtClean="0"/>
+              <a:t>Văn</a:t>
+            </a:r>
+            <a:r>
+              <a:rPr lang="en-US" dirty="0" smtClean="0"/>
+              <a:t> Khan</a:t>
+            </a:r>
+            <a:endParaRPr lang="en-US" dirty="0"/>
           </a:p>
         </p:txBody>
       </p:sp>
@@ -5352,7 +5750,7 @@
         <p:spPr>
           <a:xfrm>
             <a:off x="4191000" y="1600200"/>
-            <a:ext cx="4114800" cy="1200329"/>
+            <a:ext cx="4114800" cy="923330"/>
           </a:xfrm>
           <a:prstGeom prst="rect">
             <a:avLst/>
@@ -5393,20 +5791,56 @@
           <a:p>
             <a:r>
               <a:rPr lang="en-US" dirty="0" smtClean="0"/>
-              <a:t>1</a:t>
-            </a:r>
-          </a:p>
-          <a:p>
-            <a:r>
-              <a:rPr lang="en-US" dirty="0" smtClean="0"/>
-              <a:t>2</a:t>
-            </a:r>
-          </a:p>
-          <a:p>
-            <a:r>
-              <a:rPr lang="en-US" dirty="0"/>
-              <a:t>3</a:t>
-            </a:r>
+              <a:t>1. </a:t>
+            </a:r>
+            <a:r>
+              <a:rPr lang="en-US" dirty="0" err="1" smtClean="0"/>
+              <a:t>Nguyễn</a:t>
+            </a:r>
+            <a:r>
+              <a:rPr lang="en-US" dirty="0" smtClean="0"/>
+              <a:t> Minh </a:t>
+            </a:r>
+            <a:r>
+              <a:rPr lang="en-US" dirty="0" err="1" smtClean="0"/>
+              <a:t>Đức</a:t>
+            </a:r>
+            <a:r>
+              <a:rPr lang="en-US" dirty="0" smtClean="0"/>
+              <a:t>.</a:t>
+            </a:r>
+            <a:endParaRPr lang="en-US" dirty="0" smtClean="0"/>
+          </a:p>
+          <a:p>
+            <a:r>
+              <a:rPr lang="en-US" dirty="0" smtClean="0"/>
+              <a:t>2. </a:t>
+            </a:r>
+            <a:r>
+              <a:rPr lang="en-US" dirty="0" err="1" smtClean="0"/>
+              <a:t>Bùi</a:t>
+            </a:r>
+            <a:r>
+              <a:rPr lang="en-US" dirty="0" smtClean="0"/>
+              <a:t> </a:t>
+            </a:r>
+            <a:r>
+              <a:rPr lang="en-US" dirty="0" err="1" smtClean="0"/>
+              <a:t>Tiến</a:t>
+            </a:r>
+            <a:r>
+              <a:rPr lang="en-US" dirty="0" smtClean="0"/>
+              <a:t> </a:t>
+            </a:r>
+            <a:r>
+              <a:rPr lang="en-US" dirty="0" err="1" smtClean="0"/>
+              <a:t>Phát</a:t>
+            </a:r>
+            <a:r>
+              <a:rPr lang="en-US" dirty="0" smtClean="0"/>
+              <a:t>.</a:t>
+            </a:r>
+            <a:endParaRPr lang="en-US" dirty="0" smtClean="0"/>
           </a:p>
         </p:txBody>
       </p:sp>

</xml_diff>

<commit_message>
Sua Slide 3,7 , cuoi cung
Phat Bui
</commit_message>
<xml_diff>
--- a/nhom 7.pptx
+++ b/nhom 7.pptx
@@ -4191,7 +4191,7 @@
         </p:nvSpPr>
         <p:spPr>
           <a:xfrm>
-            <a:off x="1295400" y="2514600"/>
+            <a:off x="1371600" y="2514600"/>
             <a:ext cx="6400800" cy="369332"/>
           </a:xfrm>
           <a:prstGeom prst="rect">
@@ -4275,9 +4275,9 @@
             </a:r>
             <a:r>
               <a:rPr lang="en-US" smtClean="0"/>
-              <a:t>!!!</a:t>
-            </a:r>
-            <a:endParaRPr lang="en-US"/>
+              <a:t>!!</a:t>
+            </a:r>
+            <a:endParaRPr lang="en-US" dirty="0"/>
           </a:p>
         </p:txBody>
       </p:sp>
@@ -4590,7 +4590,6 @@
               <a:rPr lang="en-US" dirty="0" smtClean="0"/>
               <a:t>.</a:t>
             </a:r>
-            <a:endParaRPr lang="en-US" dirty="0" smtClean="0"/>
           </a:p>
           <a:p>
             <a:r>
@@ -4698,7 +4697,6 @@
               <a:rPr lang="en-US" dirty="0" smtClean="0"/>
               <a:t>.</a:t>
             </a:r>
-            <a:endParaRPr lang="en-US" dirty="0" smtClean="0"/>
           </a:p>
           <a:p>
             <a:r>
@@ -4918,7 +4916,6 @@
               <a:rPr lang="en-US" dirty="0" smtClean="0"/>
               <a:t> S9400w</a:t>
             </a:r>
-            <a:endParaRPr lang="en-US" dirty="0" smtClean="0"/>
           </a:p>
           <a:p>
             <a:r>
@@ -4933,14 +4930,12 @@
               <a:rPr lang="en-US" dirty="0" smtClean="0"/>
               <a:t> 4 Express</a:t>
             </a:r>
-            <a:endParaRPr lang="en-US" dirty="0" smtClean="0"/>
           </a:p>
           <a:p>
             <a:r>
               <a:rPr lang="en-US" dirty="0" smtClean="0"/>
               <a:t>3. Audacity</a:t>
             </a:r>
-            <a:endParaRPr lang="en-US" dirty="0" smtClean="0"/>
           </a:p>
         </p:txBody>
       </p:sp>
@@ -5653,7 +5648,6 @@
               <a:rPr lang="en-US" dirty="0" smtClean="0"/>
               <a:t>.</a:t>
             </a:r>
-            <a:endParaRPr lang="en-US" dirty="0" smtClean="0"/>
           </a:p>
           <a:p>
             <a:r>
@@ -5684,7 +5678,6 @@
               <a:rPr lang="en-US" dirty="0" smtClean="0"/>
               <a:t>.</a:t>
             </a:r>
-            <a:endParaRPr lang="en-US" dirty="0" smtClean="0"/>
           </a:p>
           <a:p>
             <a:r>
@@ -5809,7 +5802,6 @@
               <a:rPr lang="en-US" dirty="0" smtClean="0"/>
               <a:t>.</a:t>
             </a:r>
-            <a:endParaRPr lang="en-US" dirty="0" smtClean="0"/>
           </a:p>
           <a:p>
             <a:r>
@@ -5840,7 +5832,6 @@
               <a:rPr lang="en-US" dirty="0" smtClean="0"/>
               <a:t>.</a:t>
             </a:r>
-            <a:endParaRPr lang="en-US" dirty="0" smtClean="0"/>
           </a:p>
         </p:txBody>
       </p:sp>

</xml_diff>